<commit_message>
Bổ sung báo cáo + poster
</commit_message>
<xml_diff>
--- a/BaoCaoNhom/FinalReport/Poster.pptx
+++ b/BaoCaoNhom/FinalReport/Poster.pptx
@@ -192,7 +192,7 @@
           <a:p>
             <a:fld id="{D9AEE5BA-00F0-4C92-A1B7-E5C8B6980DE0}" type="datetimeFigureOut">
               <a:rPr lang="en-US" smtClean="0"/>
-              <a:t>12/6/2012</a:t>
+              <a:t>12/7/2012</a:t>
             </a:fld>
             <a:endParaRPr lang="en-US"/>
           </a:p>
@@ -725,7 +725,7 @@
           <a:p>
             <a:fld id="{DE8787CB-18CC-4955-912C-CC4503C70070}" type="datetimeFigureOut">
               <a:rPr lang="en-US" smtClean="0"/>
-              <a:t>12/6/2012</a:t>
+              <a:t>12/7/2012</a:t>
             </a:fld>
             <a:endParaRPr lang="en-US"/>
           </a:p>
@@ -895,7 +895,7 @@
           <a:p>
             <a:fld id="{DE8787CB-18CC-4955-912C-CC4503C70070}" type="datetimeFigureOut">
               <a:rPr lang="en-US" smtClean="0"/>
-              <a:t>12/6/2012</a:t>
+              <a:t>12/7/2012</a:t>
             </a:fld>
             <a:endParaRPr lang="en-US"/>
           </a:p>
@@ -1075,7 +1075,7 @@
           <a:p>
             <a:fld id="{DE8787CB-18CC-4955-912C-CC4503C70070}" type="datetimeFigureOut">
               <a:rPr lang="en-US" smtClean="0"/>
-              <a:t>12/6/2012</a:t>
+              <a:t>12/7/2012</a:t>
             </a:fld>
             <a:endParaRPr lang="en-US"/>
           </a:p>
@@ -1245,7 +1245,7 @@
           <a:p>
             <a:fld id="{DE8787CB-18CC-4955-912C-CC4503C70070}" type="datetimeFigureOut">
               <a:rPr lang="en-US" smtClean="0"/>
-              <a:t>12/6/2012</a:t>
+              <a:t>12/7/2012</a:t>
             </a:fld>
             <a:endParaRPr lang="en-US"/>
           </a:p>
@@ -1491,7 +1491,7 @@
           <a:p>
             <a:fld id="{DE8787CB-18CC-4955-912C-CC4503C70070}" type="datetimeFigureOut">
               <a:rPr lang="en-US" smtClean="0"/>
-              <a:t>12/6/2012</a:t>
+              <a:t>12/7/2012</a:t>
             </a:fld>
             <a:endParaRPr lang="en-US"/>
           </a:p>
@@ -1779,7 +1779,7 @@
           <a:p>
             <a:fld id="{DE8787CB-18CC-4955-912C-CC4503C70070}" type="datetimeFigureOut">
               <a:rPr lang="en-US" smtClean="0"/>
-              <a:t>12/6/2012</a:t>
+              <a:t>12/7/2012</a:t>
             </a:fld>
             <a:endParaRPr lang="en-US"/>
           </a:p>
@@ -2201,7 +2201,7 @@
           <a:p>
             <a:fld id="{DE8787CB-18CC-4955-912C-CC4503C70070}" type="datetimeFigureOut">
               <a:rPr lang="en-US" smtClean="0"/>
-              <a:t>12/6/2012</a:t>
+              <a:t>12/7/2012</a:t>
             </a:fld>
             <a:endParaRPr lang="en-US"/>
           </a:p>
@@ -2319,7 +2319,7 @@
           <a:p>
             <a:fld id="{DE8787CB-18CC-4955-912C-CC4503C70070}" type="datetimeFigureOut">
               <a:rPr lang="en-US" smtClean="0"/>
-              <a:t>12/6/2012</a:t>
+              <a:t>12/7/2012</a:t>
             </a:fld>
             <a:endParaRPr lang="en-US"/>
           </a:p>
@@ -2414,7 +2414,7 @@
           <a:p>
             <a:fld id="{DE8787CB-18CC-4955-912C-CC4503C70070}" type="datetimeFigureOut">
               <a:rPr lang="en-US" smtClean="0"/>
-              <a:t>12/6/2012</a:t>
+              <a:t>12/7/2012</a:t>
             </a:fld>
             <a:endParaRPr lang="en-US"/>
           </a:p>
@@ -2691,7 +2691,7 @@
           <a:p>
             <a:fld id="{DE8787CB-18CC-4955-912C-CC4503C70070}" type="datetimeFigureOut">
               <a:rPr lang="en-US" smtClean="0"/>
-              <a:t>12/6/2012</a:t>
+              <a:t>12/7/2012</a:t>
             </a:fld>
             <a:endParaRPr lang="en-US"/>
           </a:p>
@@ -2944,7 +2944,7 @@
           <a:p>
             <a:fld id="{DE8787CB-18CC-4955-912C-CC4503C70070}" type="datetimeFigureOut">
               <a:rPr lang="en-US" smtClean="0"/>
-              <a:t>12/6/2012</a:t>
+              <a:t>12/7/2012</a:t>
             </a:fld>
             <a:endParaRPr lang="en-US"/>
           </a:p>
@@ -3157,7 +3157,7 @@
           <a:p>
             <a:fld id="{DE8787CB-18CC-4955-912C-CC4503C70070}" type="datetimeFigureOut">
               <a:rPr lang="en-US" smtClean="0"/>
-              <a:t>12/6/2012</a:t>
+              <a:t>12/7/2012</a:t>
             </a:fld>
             <a:endParaRPr lang="en-US"/>
           </a:p>
@@ -3693,8 +3693,8 @@
         </p:nvSpPr>
         <p:spPr>
           <a:xfrm>
-            <a:off x="442752" y="6653213"/>
-            <a:ext cx="20533210" cy="1414669"/>
+            <a:off x="442751" y="6653213"/>
+            <a:ext cx="20609407" cy="1414669"/>
           </a:xfrm>
           <a:prstGeom prst="roundRect">
             <a:avLst>
@@ -4401,25 +4401,7 @@
                 <a:ea typeface="Tahoma" pitchFamily="34" charset="0"/>
                 <a:cs typeface="Tahoma" pitchFamily="34" charset="0"/>
               </a:rPr>
-              <a:t> </a:t>
-            </a:r>
-            <a:r>
-              <a:rPr lang="en-US" sz="4000" b="1" dirty="0" smtClean="0">
-                <a:solidFill>
-                  <a:srgbClr val="FF0000"/>
-                </a:solidFill>
-                <a:effectLst>
-                  <a:outerShdw blurRad="38100" dist="38100" dir="2700000" algn="tl">
-                    <a:srgbClr val="000000">
-                      <a:alpha val="43137"/>
-                    </a:srgbClr>
-                  </a:outerShdw>
-                </a:effectLst>
-                <a:latin typeface="Tahoma" pitchFamily="34" charset="0"/>
-                <a:ea typeface="Tahoma" pitchFamily="34" charset="0"/>
-                <a:cs typeface="Tahoma" pitchFamily="34" charset="0"/>
-              </a:rPr>
-              <a:t>5</a:t>
+              <a:t> 5</a:t>
             </a:r>
             <a:endParaRPr lang="en-US" sz="4000" b="1" dirty="0">
               <a:solidFill>
@@ -4506,41 +4488,8 @@
           <a:bodyPr rtlCol="0" anchor="ctr"/>
           <a:lstStyle/>
           <a:p>
-            <a:pPr indent="400050" algn="ctr"/>
-            <a:r>
-              <a:rPr lang="en-US" sz="2600" dirty="0" err="1" smtClean="0">
-                <a:solidFill>
-                  <a:schemeClr val="tx1"/>
-                </a:solidFill>
-                <a:latin typeface="Verdana" pitchFamily="34" charset="0"/>
-                <a:ea typeface="Verdana" pitchFamily="34" charset="0"/>
-                <a:cs typeface="Verdana" pitchFamily="34" charset="0"/>
-              </a:rPr>
-              <a:t>Mô</a:t>
-            </a:r>
-            <a:r>
-              <a:rPr lang="en-US" sz="2600" dirty="0" smtClean="0">
-                <a:solidFill>
-                  <a:schemeClr val="tx1"/>
-                </a:solidFill>
-                <a:latin typeface="Verdana" pitchFamily="34" charset="0"/>
-                <a:ea typeface="Verdana" pitchFamily="34" charset="0"/>
-                <a:cs typeface="Verdana" pitchFamily="34" charset="0"/>
-              </a:rPr>
-              <a:t> </a:t>
-            </a:r>
-            <a:r>
-              <a:rPr lang="en-US" sz="2600" dirty="0" err="1" smtClean="0">
-                <a:solidFill>
-                  <a:schemeClr val="tx1"/>
-                </a:solidFill>
-                <a:latin typeface="Verdana" pitchFamily="34" charset="0"/>
-                <a:ea typeface="Verdana" pitchFamily="34" charset="0"/>
-                <a:cs typeface="Verdana" pitchFamily="34" charset="0"/>
-              </a:rPr>
-              <a:t>tả</a:t>
-            </a:r>
-            <a:endParaRPr lang="en-US" sz="2600" dirty="0">
+            <a:pPr algn="ctr"/>
+            <a:endParaRPr lang="en-US" sz="1600" dirty="0">
               <a:solidFill>
                 <a:schemeClr val="tx1"/>
               </a:solidFill>
@@ -4644,25 +4593,7 @@
                 <a:ea typeface="Tahoma" pitchFamily="34" charset="0"/>
                 <a:cs typeface="Tahoma" pitchFamily="34" charset="0"/>
               </a:rPr>
-              <a:t> </a:t>
-            </a:r>
-            <a:r>
-              <a:rPr lang="en-US" sz="4000" b="1" dirty="0" smtClean="0">
-                <a:solidFill>
-                  <a:srgbClr val="FF0000"/>
-                </a:solidFill>
-                <a:effectLst>
-                  <a:outerShdw blurRad="38100" dist="38100" dir="2700000" algn="tl">
-                    <a:srgbClr val="000000">
-                      <a:alpha val="43137"/>
-                    </a:srgbClr>
-                  </a:outerShdw>
-                </a:effectLst>
-                <a:latin typeface="Tahoma" pitchFamily="34" charset="0"/>
-                <a:ea typeface="Tahoma" pitchFamily="34" charset="0"/>
-                <a:cs typeface="Tahoma" pitchFamily="34" charset="0"/>
-              </a:rPr>
-              <a:t>8</a:t>
+              <a:t> 8</a:t>
             </a:r>
             <a:endParaRPr lang="en-US" sz="4000" b="1" dirty="0">
               <a:solidFill>
@@ -4694,9 +4625,7 @@
             <a:ext cx="13407391" cy="2209801"/>
           </a:xfrm>
           <a:prstGeom prst="roundRect">
-            <a:avLst>
-              <a:gd name="adj" fmla="val 2159"/>
-            </a:avLst>
+            <a:avLst/>
           </a:prstGeom>
           <a:gradFill flip="none" rotWithShape="1">
             <a:gsLst>
@@ -4753,48 +4682,60 @@
           <a:bodyPr rtlCol="0" anchor="ctr"/>
           <a:lstStyle/>
           <a:p>
-            <a:pPr indent="400050" algn="ctr"/>
-            <a:r>
-              <a:rPr lang="en-US" sz="2600" dirty="0" err="1" smtClean="0">
-                <a:solidFill>
-                  <a:schemeClr val="tx1"/>
-                </a:solidFill>
-                <a:latin typeface="Verdana" pitchFamily="34" charset="0"/>
-                <a:ea typeface="Verdana" pitchFamily="34" charset="0"/>
-                <a:cs typeface="Verdana" pitchFamily="34" charset="0"/>
-              </a:rPr>
-              <a:t>Mô</a:t>
-            </a:r>
-            <a:r>
-              <a:rPr lang="en-US" sz="2600" dirty="0" smtClean="0">
-                <a:solidFill>
-                  <a:schemeClr val="tx1"/>
-                </a:solidFill>
-                <a:latin typeface="Verdana" pitchFamily="34" charset="0"/>
-                <a:ea typeface="Verdana" pitchFamily="34" charset="0"/>
-                <a:cs typeface="Verdana" pitchFamily="34" charset="0"/>
-              </a:rPr>
-              <a:t> </a:t>
-            </a:r>
-            <a:r>
-              <a:rPr lang="en-US" sz="2600" dirty="0" err="1" smtClean="0">
-                <a:solidFill>
-                  <a:schemeClr val="tx1"/>
-                </a:solidFill>
-                <a:latin typeface="Verdana" pitchFamily="34" charset="0"/>
-                <a:ea typeface="Verdana" pitchFamily="34" charset="0"/>
-                <a:cs typeface="Verdana" pitchFamily="34" charset="0"/>
-              </a:rPr>
-              <a:t>tả</a:t>
-            </a:r>
-            <a:endParaRPr lang="en-US" sz="2600" dirty="0">
-              <a:solidFill>
-                <a:schemeClr val="tx1"/>
-              </a:solidFill>
-              <a:latin typeface="Verdana" pitchFamily="34" charset="0"/>
-              <a:ea typeface="Verdana" pitchFamily="34" charset="0"/>
-              <a:cs typeface="Verdana" pitchFamily="34" charset="0"/>
-            </a:endParaRPr>
+            <a:pPr marL="347663" indent="-347663"/>
+            <a:r>
+              <a:rPr lang="vi-VN" dirty="0">
+                <a:solidFill>
+                  <a:schemeClr val="tx1"/>
+                </a:solidFill>
+                <a:latin typeface="Verdana" pitchFamily="34" charset="0"/>
+                <a:ea typeface="Verdana" pitchFamily="34" charset="0"/>
+                <a:cs typeface="Verdana" pitchFamily="34" charset="0"/>
+              </a:rPr>
+              <a:t>•	Hoàn chỉnh với các chức năng cơ bản: đăng nhập/xuất, đăng ký, tìm sách, đặt sách, nhận sách, trả sách,…</a:t>
+            </a:r>
+          </a:p>
+          <a:p>
+            <a:pPr marL="347663" indent="-347663"/>
+            <a:r>
+              <a:rPr lang="vi-VN" dirty="0">
+                <a:solidFill>
+                  <a:schemeClr val="tx1"/>
+                </a:solidFill>
+                <a:latin typeface="Verdana" pitchFamily="34" charset="0"/>
+                <a:ea typeface="Verdana" pitchFamily="34" charset="0"/>
+                <a:cs typeface="Verdana" pitchFamily="34" charset="0"/>
+              </a:rPr>
+              <a:t>•	Một số chức năng nâng cao như nâng/hạ quyền user, thêm phân loại sách, gửi email thông báo tự động, đa ngôn ngữ.</a:t>
+            </a:r>
+          </a:p>
+          <a:p>
+            <a:pPr marL="347663" indent="-347663"/>
+            <a:r>
+              <a:rPr lang="vi-VN" dirty="0">
+                <a:solidFill>
+                  <a:schemeClr val="tx1"/>
+                </a:solidFill>
+                <a:latin typeface="Verdana" pitchFamily="34" charset="0"/>
+                <a:ea typeface="Verdana" pitchFamily="34" charset="0"/>
+                <a:cs typeface="Verdana" pitchFamily="34" charset="0"/>
+              </a:rPr>
+              <a:t>•	Vẫn còn một số chức năng chưa hoàn thiện (thống kê, xem thông tin các thủ thư, sửa FAQ, sửa rule, đa ngôn ngữ).</a:t>
+            </a:r>
+          </a:p>
+          <a:p>
+            <a:pPr marL="347663" indent="-347663"/>
+            <a:r>
+              <a:rPr lang="vi-VN" dirty="0">
+                <a:solidFill>
+                  <a:schemeClr val="tx1"/>
+                </a:solidFill>
+                <a:latin typeface="Verdana" pitchFamily="34" charset="0"/>
+                <a:ea typeface="Verdana" pitchFamily="34" charset="0"/>
+                <a:cs typeface="Verdana" pitchFamily="34" charset="0"/>
+              </a:rPr>
+              <a:t>•	Mục FAQ và Rule chưa có phiên bản tiếng Anh, một số trang gặp vấn đề về layout khi thay đổi kích thước trình duyệt.</a:t>
+            </a:r>
           </a:p>
         </p:txBody>
       </p:sp>
@@ -5516,16 +5457,16 @@
       </p:sp>
       <p:sp>
         <p:nvSpPr>
-          <p:cNvPr id="40" name="Rectangle 39"/>
+          <p:cNvPr id="40" name="Rounded Rectangle 39"/>
           <p:cNvSpPr/>
           <p:nvPr/>
         </p:nvSpPr>
         <p:spPr>
           <a:xfrm>
-            <a:off x="442750" y="20373319"/>
+            <a:off x="442750" y="20547806"/>
             <a:ext cx="3755950" cy="2765287"/>
           </a:xfrm>
-          <a:prstGeom prst="rect">
+          <a:prstGeom prst="roundRect">
             <a:avLst/>
           </a:prstGeom>
           <a:solidFill>
@@ -5556,128 +5497,127 @@
           <a:bodyPr rtlCol="0" anchor="ctr"/>
           <a:lstStyle/>
           <a:p>
-            <a:pPr algn="ctr"/>
-            <a:r>
-              <a:rPr lang="en-US" sz="2600" dirty="0" err="1" smtClean="0">
-                <a:solidFill>
-                  <a:schemeClr val="tx1"/>
-                </a:solidFill>
-                <a:latin typeface="Verdana" pitchFamily="34" charset="0"/>
-                <a:ea typeface="Verdana" pitchFamily="34" charset="0"/>
-                <a:cs typeface="Verdana" pitchFamily="34" charset="0"/>
-              </a:rPr>
-              <a:t>Hình</a:t>
-            </a:r>
-            <a:r>
-              <a:rPr lang="en-US" sz="2600" dirty="0" smtClean="0">
-                <a:solidFill>
-                  <a:schemeClr val="tx1"/>
-                </a:solidFill>
-                <a:latin typeface="Verdana" pitchFamily="34" charset="0"/>
-                <a:ea typeface="Verdana" pitchFamily="34" charset="0"/>
-                <a:cs typeface="Verdana" pitchFamily="34" charset="0"/>
-              </a:rPr>
-              <a:t> </a:t>
-            </a:r>
-            <a:r>
-              <a:rPr lang="en-US" sz="2600" dirty="0" err="1" smtClean="0">
-                <a:solidFill>
-                  <a:schemeClr val="tx1"/>
-                </a:solidFill>
-                <a:latin typeface="Verdana" pitchFamily="34" charset="0"/>
-                <a:ea typeface="Verdana" pitchFamily="34" charset="0"/>
-                <a:cs typeface="Verdana" pitchFamily="34" charset="0"/>
-              </a:rPr>
-              <a:t>ảnh</a:t>
-            </a:r>
-            <a:endParaRPr lang="en-US" sz="2600" dirty="0">
-              <a:solidFill>
-                <a:schemeClr val="tx1"/>
-              </a:solidFill>
-              <a:latin typeface="Verdana" pitchFamily="34" charset="0"/>
-              <a:ea typeface="Verdana" pitchFamily="34" charset="0"/>
-              <a:cs typeface="Verdana" pitchFamily="34" charset="0"/>
-            </a:endParaRPr>
-          </a:p>
-        </p:txBody>
-      </p:sp>
-      <p:sp>
-        <p:nvSpPr>
-          <p:cNvPr id="43" name="Rectangle 42"/>
-          <p:cNvSpPr/>
-          <p:nvPr/>
-        </p:nvSpPr>
-        <p:spPr>
-          <a:xfrm>
-            <a:off x="442751" y="26589693"/>
-            <a:ext cx="6549788" cy="3330713"/>
-          </a:xfrm>
-          <a:prstGeom prst="rect">
-            <a:avLst/>
-          </a:prstGeom>
-          <a:solidFill>
-            <a:schemeClr val="accent1">
-              <a:lumMod val="20000"/>
-              <a:lumOff val="80000"/>
-              <a:alpha val="32157"/>
-            </a:schemeClr>
-          </a:solidFill>
-        </p:spPr>
-        <p:style>
-          <a:lnRef idx="2">
-            <a:schemeClr val="accent1">
-              <a:shade val="50000"/>
-            </a:schemeClr>
-          </a:lnRef>
-          <a:fillRef idx="1">
-            <a:schemeClr val="accent1"/>
-          </a:fillRef>
-          <a:effectRef idx="0">
-            <a:schemeClr val="accent1"/>
-          </a:effectRef>
-          <a:fontRef idx="minor">
-            <a:schemeClr val="lt1"/>
-          </a:fontRef>
-        </p:style>
-        <p:txBody>
-          <a:bodyPr rtlCol="0" anchor="ctr"/>
-          <a:lstStyle/>
-          <a:p>
-            <a:pPr algn="ctr"/>
-            <a:r>
-              <a:rPr lang="en-US" sz="2600" dirty="0" err="1" smtClean="0">
-                <a:solidFill>
-                  <a:schemeClr val="tx1"/>
-                </a:solidFill>
-                <a:latin typeface="Verdana" pitchFamily="34" charset="0"/>
-                <a:ea typeface="Verdana" pitchFamily="34" charset="0"/>
-                <a:cs typeface="Verdana" pitchFamily="34" charset="0"/>
-              </a:rPr>
-              <a:t>Hình</a:t>
-            </a:r>
-            <a:r>
-              <a:rPr lang="en-US" sz="2600" dirty="0" smtClean="0">
-                <a:solidFill>
-                  <a:schemeClr val="tx1"/>
-                </a:solidFill>
-                <a:latin typeface="Verdana" pitchFamily="34" charset="0"/>
-                <a:ea typeface="Verdana" pitchFamily="34" charset="0"/>
-                <a:cs typeface="Verdana" pitchFamily="34" charset="0"/>
-              </a:rPr>
-              <a:t> </a:t>
-            </a:r>
-            <a:r>
-              <a:rPr lang="en-US" sz="2600" dirty="0" err="1" smtClean="0">
-                <a:solidFill>
-                  <a:schemeClr val="tx1"/>
-                </a:solidFill>
-                <a:latin typeface="Verdana" pitchFamily="34" charset="0"/>
-                <a:ea typeface="Verdana" pitchFamily="34" charset="0"/>
-                <a:cs typeface="Verdana" pitchFamily="34" charset="0"/>
-              </a:rPr>
-              <a:t>ảnh</a:t>
-            </a:r>
-            <a:endParaRPr lang="en-US" sz="2600" dirty="0">
+            <a:pPr marL="342900" indent="-342900"/>
+            <a:r>
+              <a:rPr lang="vi-VN" dirty="0">
+                <a:solidFill>
+                  <a:schemeClr val="tx1"/>
+                </a:solidFill>
+                <a:latin typeface="Verdana" pitchFamily="34" charset="0"/>
+                <a:ea typeface="Verdana" pitchFamily="34" charset="0"/>
+                <a:cs typeface="Verdana" pitchFamily="34" charset="0"/>
+              </a:rPr>
+              <a:t>•	Chỉ có đối với thủ thư (admin) website.</a:t>
+            </a:r>
+          </a:p>
+          <a:p>
+            <a:pPr marL="342900" indent="-342900"/>
+            <a:r>
+              <a:rPr lang="vi-VN" dirty="0">
+                <a:solidFill>
+                  <a:schemeClr val="tx1"/>
+                </a:solidFill>
+                <a:latin typeface="Verdana" pitchFamily="34" charset="0"/>
+                <a:ea typeface="Verdana" pitchFamily="34" charset="0"/>
+                <a:cs typeface="Verdana" pitchFamily="34" charset="0"/>
+              </a:rPr>
+              <a:t>•	Mục transactions trong Admin Panel</a:t>
+            </a:r>
+          </a:p>
+          <a:p>
+            <a:pPr marL="342900" indent="-342900"/>
+            <a:r>
+              <a:rPr lang="vi-VN" dirty="0">
+                <a:solidFill>
+                  <a:schemeClr val="tx1"/>
+                </a:solidFill>
+                <a:latin typeface="Verdana" pitchFamily="34" charset="0"/>
+                <a:ea typeface="Verdana" pitchFamily="34" charset="0"/>
+                <a:cs typeface="Verdana" pitchFamily="34" charset="0"/>
+              </a:rPr>
+              <a:t>•	Received </a:t>
+            </a:r>
+            <a:r>
+              <a:rPr lang="en-US" dirty="0" smtClean="0">
+                <a:solidFill>
+                  <a:schemeClr val="tx1"/>
+                </a:solidFill>
+                <a:latin typeface="Verdana" pitchFamily="34" charset="0"/>
+                <a:ea typeface="Verdana" pitchFamily="34" charset="0"/>
+                <a:cs typeface="Verdana" pitchFamily="34" charset="0"/>
+              </a:rPr>
+              <a:t>: </a:t>
+            </a:r>
+            <a:r>
+              <a:rPr lang="vi-VN" dirty="0" smtClean="0">
+                <a:solidFill>
+                  <a:schemeClr val="tx1"/>
+                </a:solidFill>
+                <a:latin typeface="Verdana" pitchFamily="34" charset="0"/>
+                <a:ea typeface="Verdana" pitchFamily="34" charset="0"/>
+                <a:cs typeface="Verdana" pitchFamily="34" charset="0"/>
+              </a:rPr>
+              <a:t>user </a:t>
+            </a:r>
+            <a:r>
+              <a:rPr lang="vi-VN" dirty="0">
+                <a:solidFill>
+                  <a:schemeClr val="tx1"/>
+                </a:solidFill>
+                <a:latin typeface="Verdana" pitchFamily="34" charset="0"/>
+                <a:ea typeface="Verdana" pitchFamily="34" charset="0"/>
+                <a:cs typeface="Verdana" pitchFamily="34" charset="0"/>
+              </a:rPr>
+              <a:t>đã nhận được sách.</a:t>
+            </a:r>
+          </a:p>
+          <a:p>
+            <a:pPr marL="342900" indent="-342900"/>
+            <a:r>
+              <a:rPr lang="vi-VN" dirty="0">
+                <a:solidFill>
+                  <a:schemeClr val="tx1"/>
+                </a:solidFill>
+                <a:latin typeface="Verdana" pitchFamily="34" charset="0"/>
+                <a:ea typeface="Verdana" pitchFamily="34" charset="0"/>
+                <a:cs typeface="Verdana" pitchFamily="34" charset="0"/>
+              </a:rPr>
+              <a:t>•	Returned </a:t>
+            </a:r>
+            <a:r>
+              <a:rPr lang="vi-VN" dirty="0" smtClean="0">
+                <a:solidFill>
+                  <a:schemeClr val="tx1"/>
+                </a:solidFill>
+                <a:latin typeface="Verdana" pitchFamily="34" charset="0"/>
+                <a:ea typeface="Verdana" pitchFamily="34" charset="0"/>
+                <a:cs typeface="Verdana" pitchFamily="34" charset="0"/>
+              </a:rPr>
+              <a:t>: </a:t>
+            </a:r>
+            <a:r>
+              <a:rPr lang="vi-VN" dirty="0">
+                <a:solidFill>
+                  <a:schemeClr val="tx1"/>
+                </a:solidFill>
+                <a:latin typeface="Verdana" pitchFamily="34" charset="0"/>
+                <a:ea typeface="Verdana" pitchFamily="34" charset="0"/>
+                <a:cs typeface="Verdana" pitchFamily="34" charset="0"/>
+              </a:rPr>
+              <a:t>user đã trả sách cho thư viện</a:t>
+            </a:r>
+            <a:r>
+              <a:rPr lang="vi-VN" dirty="0" smtClean="0">
+                <a:solidFill>
+                  <a:schemeClr val="tx1"/>
+                </a:solidFill>
+                <a:latin typeface="Verdana" pitchFamily="34" charset="0"/>
+                <a:ea typeface="Verdana" pitchFamily="34" charset="0"/>
+                <a:cs typeface="Verdana" pitchFamily="34" charset="0"/>
+              </a:rPr>
+              <a:t>.</a:t>
+            </a:r>
+            <a:endParaRPr lang="vi-VN" dirty="0">
               <a:solidFill>
                 <a:schemeClr val="tx1"/>
               </a:solidFill>
@@ -5784,7 +5724,7 @@
         <p:spPr>
           <a:xfrm>
             <a:off x="16134716" y="3545028"/>
-            <a:ext cx="4817433" cy="2787365"/>
+            <a:ext cx="4917442" cy="2787365"/>
           </a:xfrm>
           <a:prstGeom prst="rect">
             <a:avLst/>
@@ -6157,25 +6097,7 @@
                 <a:ea typeface="Tahoma" pitchFamily="34" charset="0"/>
                 <a:cs typeface="Tahoma" pitchFamily="34" charset="0"/>
               </a:rPr>
-              <a:t> </a:t>
-            </a:r>
-            <a:r>
-              <a:rPr lang="en-US" sz="4000" b="1" dirty="0" smtClean="0">
-                <a:solidFill>
-                  <a:srgbClr val="FF0000"/>
-                </a:solidFill>
-                <a:effectLst>
-                  <a:outerShdw blurRad="38100" dist="38100" dir="2700000" algn="tl">
-                    <a:srgbClr val="000000">
-                      <a:alpha val="43137"/>
-                    </a:srgbClr>
-                  </a:outerShdw>
-                </a:effectLst>
-                <a:latin typeface="Tahoma" pitchFamily="34" charset="0"/>
-                <a:ea typeface="Tahoma" pitchFamily="34" charset="0"/>
-                <a:cs typeface="Tahoma" pitchFamily="34" charset="0"/>
-              </a:rPr>
-              <a:t>2</a:t>
+              <a:t> 2</a:t>
             </a:r>
             <a:endParaRPr lang="en-US" sz="4000" b="1" dirty="0">
               <a:solidFill>
@@ -6291,7 +6213,7 @@
         <p:spPr>
           <a:xfrm>
             <a:off x="16134716" y="8827294"/>
-            <a:ext cx="4841245" cy="2957512"/>
+            <a:ext cx="4917443" cy="2957512"/>
           </a:xfrm>
           <a:prstGeom prst="rect">
             <a:avLst/>
@@ -6494,7 +6416,7 @@
         <p:spPr>
           <a:xfrm>
             <a:off x="16104394" y="12187892"/>
-            <a:ext cx="4871567" cy="1654313"/>
+            <a:ext cx="4947766" cy="1654313"/>
           </a:xfrm>
           <a:prstGeom prst="roundRect">
             <a:avLst>
@@ -6713,21 +6635,6 @@
               </a:rPr>
               <a:t>3</a:t>
             </a:r>
-            <a:endParaRPr lang="en-US" sz="4000" b="1" dirty="0">
-              <a:solidFill>
-                <a:srgbClr val="FF0000"/>
-              </a:solidFill>
-              <a:effectLst>
-                <a:outerShdw blurRad="38100" dist="38100" dir="2700000" algn="tl">
-                  <a:srgbClr val="000000">
-                    <a:alpha val="43137"/>
-                  </a:srgbClr>
-                </a:outerShdw>
-              </a:effectLst>
-              <a:latin typeface="Tahoma" pitchFamily="34" charset="0"/>
-              <a:ea typeface="Tahoma" pitchFamily="34" charset="0"/>
-              <a:cs typeface="Tahoma" pitchFamily="34" charset="0"/>
-            </a:endParaRPr>
           </a:p>
         </p:txBody>
       </p:sp>
@@ -6823,25 +6730,7 @@
                 <a:ea typeface="Tahoma" pitchFamily="34" charset="0"/>
                 <a:cs typeface="Tahoma" pitchFamily="34" charset="0"/>
               </a:rPr>
-              <a:t> </a:t>
-            </a:r>
-            <a:r>
-              <a:rPr lang="en-US" sz="4000" b="1" dirty="0" smtClean="0">
-                <a:solidFill>
-                  <a:srgbClr val="FF0000"/>
-                </a:solidFill>
-                <a:effectLst>
-                  <a:outerShdw blurRad="38100" dist="38100" dir="2700000" algn="tl">
-                    <a:srgbClr val="000000">
-                      <a:alpha val="43137"/>
-                    </a:srgbClr>
-                  </a:outerShdw>
-                </a:effectLst>
-                <a:latin typeface="Tahoma" pitchFamily="34" charset="0"/>
-                <a:ea typeface="Tahoma" pitchFamily="34" charset="0"/>
-                <a:cs typeface="Tahoma" pitchFamily="34" charset="0"/>
-              </a:rPr>
-              <a:t>4</a:t>
+              <a:t> 4</a:t>
             </a:r>
             <a:endParaRPr lang="en-US" sz="4000" b="1" dirty="0">
               <a:solidFill>
@@ -6984,7 +6873,7 @@
         <p:spPr>
           <a:xfrm>
             <a:off x="17006886" y="14201120"/>
-            <a:ext cx="3969075" cy="2689086"/>
+            <a:ext cx="4045274" cy="2689086"/>
           </a:xfrm>
           <a:prstGeom prst="rect">
             <a:avLst/>
@@ -7174,21 +7063,6 @@
               </a:rPr>
               <a:t>6</a:t>
             </a:r>
-            <a:endParaRPr lang="en-US" sz="4000" b="1" dirty="0">
-              <a:solidFill>
-                <a:srgbClr val="FF0000"/>
-              </a:solidFill>
-              <a:effectLst>
-                <a:outerShdw blurRad="38100" dist="38100" dir="2700000" algn="tl">
-                  <a:srgbClr val="000000">
-                    <a:alpha val="43137"/>
-                  </a:srgbClr>
-                </a:outerShdw>
-              </a:effectLst>
-              <a:latin typeface="Tahoma" pitchFamily="34" charset="0"/>
-              <a:ea typeface="Tahoma" pitchFamily="34" charset="0"/>
-              <a:cs typeface="Tahoma" pitchFamily="34" charset="0"/>
-            </a:endParaRPr>
           </a:p>
         </p:txBody>
       </p:sp>
@@ -7515,8 +7389,8 @@
         </p:nvSpPr>
         <p:spPr>
           <a:xfrm>
-            <a:off x="17006887" y="17423607"/>
-            <a:ext cx="3969074" cy="2514600"/>
+            <a:off x="17006886" y="17423607"/>
+            <a:ext cx="4045273" cy="2514600"/>
           </a:xfrm>
           <a:prstGeom prst="rect">
             <a:avLst/>
@@ -7687,25 +7561,7 @@
                 <a:ea typeface="Tahoma" pitchFamily="34" charset="0"/>
                 <a:cs typeface="Tahoma" pitchFamily="34" charset="0"/>
               </a:rPr>
-              <a:t> </a:t>
-            </a:r>
-            <a:r>
-              <a:rPr lang="en-US" sz="4000" b="1" dirty="0" smtClean="0">
-                <a:solidFill>
-                  <a:srgbClr val="FF0000"/>
-                </a:solidFill>
-                <a:effectLst>
-                  <a:outerShdw blurRad="38100" dist="38100" dir="2700000" algn="tl">
-                    <a:srgbClr val="000000">
-                      <a:alpha val="43137"/>
-                    </a:srgbClr>
-                  </a:outerShdw>
-                </a:effectLst>
-                <a:latin typeface="Tahoma" pitchFamily="34" charset="0"/>
-                <a:ea typeface="Tahoma" pitchFamily="34" charset="0"/>
-                <a:cs typeface="Tahoma" pitchFamily="34" charset="0"/>
-              </a:rPr>
-              <a:t>7</a:t>
+              <a:t> 7</a:t>
             </a:r>
             <a:endParaRPr lang="en-US" sz="4000" b="1" dirty="0">
               <a:solidFill>
@@ -7733,7 +7589,7 @@
         </p:nvSpPr>
         <p:spPr>
           <a:xfrm>
-            <a:off x="1092994" y="20373320"/>
+            <a:off x="1245394" y="20373320"/>
             <a:ext cx="10644187" cy="707886"/>
           </a:xfrm>
           <a:prstGeom prst="rect">
@@ -7764,10 +7620,10 @@
                 <a:ea typeface="Tahoma" pitchFamily="34" charset="0"/>
                 <a:cs typeface="Tahoma" pitchFamily="34" charset="0"/>
               </a:rPr>
-              <a:t>Chức</a:t>
-            </a:r>
-            <a:r>
-              <a:rPr lang="en-US" sz="4000" b="1" dirty="0" smtClean="0">
+              <a:t>Nhận</a:t>
+            </a:r>
+            <a:r>
+              <a:rPr lang="en-US" sz="4000" b="1" dirty="0">
                 <a:solidFill>
                   <a:srgbClr val="FF0000"/>
                 </a:solidFill>
@@ -7785,7 +7641,7 @@
               <a:t> </a:t>
             </a:r>
             <a:r>
-              <a:rPr lang="en-US" sz="4000" b="1" dirty="0" err="1" smtClean="0">
+              <a:rPr lang="en-US" sz="4000" b="1" dirty="0" smtClean="0">
                 <a:solidFill>
                   <a:srgbClr val="FF0000"/>
                 </a:solidFill>
@@ -7800,10 +7656,10 @@
                 <a:ea typeface="Tahoma" pitchFamily="34" charset="0"/>
                 <a:cs typeface="Tahoma" pitchFamily="34" charset="0"/>
               </a:rPr>
-              <a:t>năng</a:t>
-            </a:r>
-            <a:r>
-              <a:rPr lang="en-US" sz="4000" b="1" dirty="0" smtClean="0">
+              <a:t>- </a:t>
+            </a:r>
+            <a:r>
+              <a:rPr lang="en-US" sz="4000" b="1" dirty="0" err="1" smtClean="0">
                 <a:solidFill>
                   <a:srgbClr val="FF0000"/>
                 </a:solidFill>
@@ -7818,7 +7674,7 @@
                 <a:ea typeface="Tahoma" pitchFamily="34" charset="0"/>
                 <a:cs typeface="Tahoma" pitchFamily="34" charset="0"/>
               </a:rPr>
-              <a:t> </a:t>
+              <a:t>Trả</a:t>
             </a:r>
             <a:r>
               <a:rPr lang="en-US" sz="4000" b="1" dirty="0" smtClean="0">
@@ -7836,7 +7692,25 @@
                 <a:ea typeface="Tahoma" pitchFamily="34" charset="0"/>
                 <a:cs typeface="Tahoma" pitchFamily="34" charset="0"/>
               </a:rPr>
-              <a:t>9</a:t>
+              <a:t> </a:t>
+            </a:r>
+            <a:r>
+              <a:rPr lang="en-US" sz="4000" b="1" dirty="0" err="1" smtClean="0">
+                <a:solidFill>
+                  <a:srgbClr val="FF0000"/>
+                </a:solidFill>
+                <a:effectLst>
+                  <a:outerShdw blurRad="38100" dist="38100" dir="2700000" algn="tl">
+                    <a:srgbClr val="000000">
+                      <a:alpha val="43137"/>
+                    </a:srgbClr>
+                  </a:outerShdw>
+                </a:effectLst>
+                <a:latin typeface="Tahoma" pitchFamily="34" charset="0"/>
+                <a:ea typeface="Tahoma" pitchFamily="34" charset="0"/>
+                <a:cs typeface="Tahoma" pitchFamily="34" charset="0"/>
+              </a:rPr>
+              <a:t>sách</a:t>
             </a:r>
             <a:endParaRPr lang="en-US" sz="4000" b="1" dirty="0">
               <a:solidFill>
@@ -7858,16 +7732,16 @@
       </p:sp>
       <p:sp>
         <p:nvSpPr>
-          <p:cNvPr id="59" name="Rectangle 58"/>
+          <p:cNvPr id="59" name="Rounded Rectangle 58"/>
           <p:cNvSpPr/>
           <p:nvPr/>
         </p:nvSpPr>
         <p:spPr>
           <a:xfrm>
-            <a:off x="10922791" y="20373319"/>
+            <a:off x="10958349" y="20547149"/>
             <a:ext cx="3695011" cy="2765287"/>
           </a:xfrm>
-          <a:prstGeom prst="rect">
+          <a:prstGeom prst="roundRect">
             <a:avLst/>
           </a:prstGeom>
           <a:solidFill>
@@ -7898,41 +7772,72 @@
           <a:bodyPr rtlCol="0" anchor="ctr"/>
           <a:lstStyle/>
           <a:p>
-            <a:pPr algn="ctr"/>
-            <a:r>
-              <a:rPr lang="en-US" sz="2600" dirty="0" err="1" smtClean="0">
-                <a:solidFill>
-                  <a:schemeClr val="tx1"/>
-                </a:solidFill>
-                <a:latin typeface="Verdana" pitchFamily="34" charset="0"/>
-                <a:ea typeface="Verdana" pitchFamily="34" charset="0"/>
-                <a:cs typeface="Verdana" pitchFamily="34" charset="0"/>
-              </a:rPr>
-              <a:t>Hình</a:t>
-            </a:r>
-            <a:r>
-              <a:rPr lang="en-US" sz="2600" dirty="0" smtClean="0">
-                <a:solidFill>
-                  <a:schemeClr val="tx1"/>
-                </a:solidFill>
-                <a:latin typeface="Verdana" pitchFamily="34" charset="0"/>
-                <a:ea typeface="Verdana" pitchFamily="34" charset="0"/>
-                <a:cs typeface="Verdana" pitchFamily="34" charset="0"/>
-              </a:rPr>
-              <a:t> </a:t>
-            </a:r>
-            <a:r>
-              <a:rPr lang="en-US" sz="2600" dirty="0" err="1" smtClean="0">
-                <a:solidFill>
-                  <a:schemeClr val="tx1"/>
-                </a:solidFill>
-                <a:latin typeface="Verdana" pitchFamily="34" charset="0"/>
-                <a:ea typeface="Verdana" pitchFamily="34" charset="0"/>
-                <a:cs typeface="Verdana" pitchFamily="34" charset="0"/>
-              </a:rPr>
-              <a:t>ảnh</a:t>
-            </a:r>
-            <a:endParaRPr lang="en-US" sz="2600" dirty="0">
+            <a:pPr marL="342900" indent="-342900"/>
+            <a:r>
+              <a:rPr lang="vi-VN" dirty="0">
+                <a:solidFill>
+                  <a:schemeClr val="tx1"/>
+                </a:solidFill>
+                <a:latin typeface="Verdana" pitchFamily="34" charset="0"/>
+                <a:ea typeface="Verdana" pitchFamily="34" charset="0"/>
+                <a:cs typeface="Verdana" pitchFamily="34" charset="0"/>
+              </a:rPr>
+              <a:t>•	Chỉ có đối với thủ thư (admin) website.</a:t>
+            </a:r>
+          </a:p>
+          <a:p>
+            <a:pPr marL="342900" indent="-342900"/>
+            <a:r>
+              <a:rPr lang="vi-VN" dirty="0">
+                <a:solidFill>
+                  <a:schemeClr val="tx1"/>
+                </a:solidFill>
+                <a:latin typeface="Verdana" pitchFamily="34" charset="0"/>
+                <a:ea typeface="Verdana" pitchFamily="34" charset="0"/>
+                <a:cs typeface="Verdana" pitchFamily="34" charset="0"/>
+              </a:rPr>
+              <a:t>•	Mục View Users trong Admin Panel.</a:t>
+            </a:r>
+          </a:p>
+          <a:p>
+            <a:pPr marL="342900" indent="-342900"/>
+            <a:r>
+              <a:rPr lang="vi-VN" dirty="0">
+                <a:solidFill>
+                  <a:schemeClr val="tx1"/>
+                </a:solidFill>
+                <a:latin typeface="Verdana" pitchFamily="34" charset="0"/>
+                <a:ea typeface="Verdana" pitchFamily="34" charset="0"/>
+                <a:cs typeface="Verdana" pitchFamily="34" charset="0"/>
+              </a:rPr>
+              <a:t>•	View : xem thông tin chi tiết của một thành viên</a:t>
+            </a:r>
+          </a:p>
+          <a:p>
+            <a:pPr marL="342900" indent="-342900"/>
+            <a:r>
+              <a:rPr lang="vi-VN" dirty="0">
+                <a:solidFill>
+                  <a:schemeClr val="tx1"/>
+                </a:solidFill>
+                <a:latin typeface="Verdana" pitchFamily="34" charset="0"/>
+                <a:ea typeface="Verdana" pitchFamily="34" charset="0"/>
+                <a:cs typeface="Verdana" pitchFamily="34" charset="0"/>
+              </a:rPr>
+              <a:t>•	Set/Unset Moderate : Nâng/hạ quyền của thành viên thư </a:t>
+            </a:r>
+            <a:r>
+              <a:rPr lang="vi-VN" dirty="0" smtClean="0">
+                <a:solidFill>
+                  <a:schemeClr val="tx1"/>
+                </a:solidFill>
+                <a:latin typeface="Verdana" pitchFamily="34" charset="0"/>
+                <a:ea typeface="Verdana" pitchFamily="34" charset="0"/>
+                <a:cs typeface="Verdana" pitchFamily="34" charset="0"/>
+              </a:rPr>
+              <a:t>viện</a:t>
+            </a:r>
+            <a:endParaRPr lang="vi-VN" dirty="0">
               <a:solidFill>
                 <a:schemeClr val="tx1"/>
               </a:solidFill>
@@ -7951,7 +7856,7 @@
         </p:nvSpPr>
         <p:spPr>
           <a:xfrm>
-            <a:off x="15266194" y="21331893"/>
+            <a:off x="15189994" y="21331893"/>
             <a:ext cx="5709767" cy="1806713"/>
           </a:xfrm>
           <a:prstGeom prst="roundRect">
@@ -8063,7 +7968,7 @@
         </p:nvSpPr>
         <p:spPr>
           <a:xfrm>
-            <a:off x="11684794" y="20373320"/>
+            <a:off x="12394407" y="20373320"/>
             <a:ext cx="10644187" cy="707886"/>
           </a:xfrm>
           <a:prstGeom prst="rect">
@@ -8094,7 +7999,7 @@
                 <a:ea typeface="Tahoma" pitchFamily="34" charset="0"/>
                 <a:cs typeface="Tahoma" pitchFamily="34" charset="0"/>
               </a:rPr>
-              <a:t>Chức</a:t>
+              <a:t>Thông</a:t>
             </a:r>
             <a:r>
               <a:rPr lang="en-US" sz="4000" b="1" dirty="0" smtClean="0">
@@ -8112,7 +8017,7 @@
                 <a:ea typeface="Tahoma" pitchFamily="34" charset="0"/>
                 <a:cs typeface="Tahoma" pitchFamily="34" charset="0"/>
               </a:rPr>
-              <a:t> </a:t>
+              <a:t> tin </a:t>
             </a:r>
             <a:r>
               <a:rPr lang="en-US" sz="4000" b="1" dirty="0" err="1" smtClean="0">
@@ -8130,7 +8035,7 @@
                 <a:ea typeface="Tahoma" pitchFamily="34" charset="0"/>
                 <a:cs typeface="Tahoma" pitchFamily="34" charset="0"/>
               </a:rPr>
-              <a:t>năng</a:t>
+              <a:t>thành</a:t>
             </a:r>
             <a:r>
               <a:rPr lang="en-US" sz="4000" b="1" dirty="0" smtClean="0">
@@ -8151,7 +8056,7 @@
               <a:t> </a:t>
             </a:r>
             <a:r>
-              <a:rPr lang="en-US" sz="4000" b="1" dirty="0" smtClean="0">
+              <a:rPr lang="en-US" sz="4000" b="1" dirty="0" err="1" smtClean="0">
                 <a:solidFill>
                   <a:srgbClr val="FF0000"/>
                 </a:solidFill>
@@ -8166,7 +8071,7 @@
                 <a:ea typeface="Tahoma" pitchFamily="34" charset="0"/>
                 <a:cs typeface="Tahoma" pitchFamily="34" charset="0"/>
               </a:rPr>
-              <a:t>10</a:t>
+              <a:t>viên</a:t>
             </a:r>
             <a:endParaRPr lang="en-US" sz="4000" b="1" dirty="0">
               <a:solidFill>
@@ -8188,7 +8093,7 @@
       </p:sp>
       <p:sp>
         <p:nvSpPr>
-          <p:cNvPr id="62" name="Rectangle 61"/>
+          <p:cNvPr id="62" name="Rounded Rectangle 61"/>
           <p:cNvSpPr/>
           <p:nvPr/>
         </p:nvSpPr>
@@ -8197,7 +8102,7 @@
             <a:off x="442750" y="23649920"/>
             <a:ext cx="3755950" cy="2689086"/>
           </a:xfrm>
-          <a:prstGeom prst="rect">
+          <a:prstGeom prst="roundRect">
             <a:avLst/>
           </a:prstGeom>
           <a:solidFill>
@@ -8228,48 +8133,46 @@
           <a:bodyPr rtlCol="0" anchor="ctr"/>
           <a:lstStyle/>
           <a:p>
-            <a:pPr algn="ctr"/>
-            <a:r>
-              <a:rPr lang="en-US" sz="2600" dirty="0" err="1" smtClean="0">
-                <a:solidFill>
-                  <a:schemeClr val="tx1"/>
-                </a:solidFill>
-                <a:latin typeface="Verdana" pitchFamily="34" charset="0"/>
-                <a:ea typeface="Verdana" pitchFamily="34" charset="0"/>
-                <a:cs typeface="Verdana" pitchFamily="34" charset="0"/>
-              </a:rPr>
-              <a:t>Hình</a:t>
-            </a:r>
-            <a:r>
-              <a:rPr lang="en-US" sz="2600" dirty="0" smtClean="0">
-                <a:solidFill>
-                  <a:schemeClr val="tx1"/>
-                </a:solidFill>
-                <a:latin typeface="Verdana" pitchFamily="34" charset="0"/>
-                <a:ea typeface="Verdana" pitchFamily="34" charset="0"/>
-                <a:cs typeface="Verdana" pitchFamily="34" charset="0"/>
-              </a:rPr>
-              <a:t> </a:t>
-            </a:r>
-            <a:r>
-              <a:rPr lang="en-US" sz="2600" dirty="0" err="1" smtClean="0">
-                <a:solidFill>
-                  <a:schemeClr val="tx1"/>
-                </a:solidFill>
-                <a:latin typeface="Verdana" pitchFamily="34" charset="0"/>
-                <a:ea typeface="Verdana" pitchFamily="34" charset="0"/>
-                <a:cs typeface="Verdana" pitchFamily="34" charset="0"/>
-              </a:rPr>
-              <a:t>ảnh</a:t>
-            </a:r>
-            <a:endParaRPr lang="en-US" sz="2600" dirty="0">
-              <a:solidFill>
-                <a:schemeClr val="tx1"/>
-              </a:solidFill>
-              <a:latin typeface="Verdana" pitchFamily="34" charset="0"/>
-              <a:ea typeface="Verdana" pitchFamily="34" charset="0"/>
-              <a:cs typeface="Verdana" pitchFamily="34" charset="0"/>
-            </a:endParaRPr>
+            <a:pPr marL="285750" indent="-285750"/>
+            <a:r>
+              <a:rPr lang="vi-VN" dirty="0">
+                <a:solidFill>
+                  <a:schemeClr val="tx1"/>
+                </a:solidFill>
+                <a:latin typeface="Verdana" pitchFamily="34" charset="0"/>
+                <a:ea typeface="Verdana" pitchFamily="34" charset="0"/>
+                <a:cs typeface="Verdana" pitchFamily="34" charset="0"/>
+              </a:rPr>
+              <a:t>•	Chỉ có đối với thủ thư (admin) website.</a:t>
+            </a:r>
+          </a:p>
+          <a:p>
+            <a:pPr marL="285750" indent="-285750"/>
+            <a:r>
+              <a:rPr lang="vi-VN" dirty="0">
+                <a:solidFill>
+                  <a:schemeClr val="tx1"/>
+                </a:solidFill>
+                <a:latin typeface="Verdana" pitchFamily="34" charset="0"/>
+                <a:ea typeface="Verdana" pitchFamily="34" charset="0"/>
+                <a:cs typeface="Verdana" pitchFamily="34" charset="0"/>
+              </a:rPr>
+              <a:t>•	Mục View Books trong Admin Panel.</a:t>
+            </a:r>
+          </a:p>
+          <a:p>
+            <a:pPr marL="285750" indent="-285750"/>
+            <a:r>
+              <a:rPr lang="vi-VN" dirty="0">
+                <a:solidFill>
+                  <a:schemeClr val="tx1"/>
+                </a:solidFill>
+                <a:latin typeface="Verdana" pitchFamily="34" charset="0"/>
+                <a:ea typeface="Verdana" pitchFamily="34" charset="0"/>
+                <a:cs typeface="Verdana" pitchFamily="34" charset="0"/>
+              </a:rPr>
+              <a:t>•	Edit: Xem và chỉnh sửa thông tin chi tiết của một cuốn sách</a:t>
+            </a:r>
           </a:p>
         </p:txBody>
       </p:sp>
@@ -8387,7 +8290,7 @@
       </p:sp>
       <p:sp>
         <p:nvSpPr>
-          <p:cNvPr id="64" name="Rectangle 63"/>
+          <p:cNvPr id="64" name="Rounded Rectangle 63"/>
           <p:cNvSpPr/>
           <p:nvPr/>
         </p:nvSpPr>
@@ -8396,7 +8299,7 @@
             <a:off x="10922795" y="23649920"/>
             <a:ext cx="3695008" cy="2689086"/>
           </a:xfrm>
-          <a:prstGeom prst="rect">
+          <a:prstGeom prst="roundRect">
             <a:avLst/>
           </a:prstGeom>
           <a:solidFill>
@@ -8427,20 +8330,70 @@
           <a:bodyPr rtlCol="0" anchor="ctr"/>
           <a:lstStyle/>
           <a:p>
-            <a:pPr algn="ctr"/>
-            <a:r>
-              <a:rPr lang="en-US" sz="2600" dirty="0" err="1" smtClean="0">
-                <a:solidFill>
-                  <a:schemeClr val="tx1"/>
-                </a:solidFill>
-                <a:latin typeface="Verdana" pitchFamily="34" charset="0"/>
-                <a:ea typeface="Verdana" pitchFamily="34" charset="0"/>
-                <a:cs typeface="Verdana" pitchFamily="34" charset="0"/>
-              </a:rPr>
-              <a:t>Hình</a:t>
-            </a:r>
-            <a:r>
-              <a:rPr lang="en-US" sz="2600" dirty="0" smtClean="0">
+            <a:pPr marL="400050" indent="-400050"/>
+            <a:r>
+              <a:rPr lang="vi-VN" dirty="0" smtClean="0">
+                <a:solidFill>
+                  <a:schemeClr val="tx1"/>
+                </a:solidFill>
+                <a:latin typeface="Verdana" pitchFamily="34" charset="0"/>
+                <a:ea typeface="Verdana" pitchFamily="34" charset="0"/>
+                <a:cs typeface="Verdana" pitchFamily="34" charset="0"/>
+              </a:rPr>
+              <a:t>•</a:t>
+            </a:r>
+            <a:r>
+              <a:rPr lang="vi-VN" dirty="0">
+                <a:solidFill>
+                  <a:schemeClr val="tx1"/>
+                </a:solidFill>
+                <a:latin typeface="Verdana" pitchFamily="34" charset="0"/>
+                <a:ea typeface="Verdana" pitchFamily="34" charset="0"/>
+                <a:cs typeface="Verdana" pitchFamily="34" charset="0"/>
+              </a:rPr>
+              <a:t>	Chỉ có đối với thủ thư (admin) website.</a:t>
+            </a:r>
+          </a:p>
+          <a:p>
+            <a:pPr marL="400050" indent="-400050"/>
+            <a:r>
+              <a:rPr lang="vi-VN" dirty="0">
+                <a:solidFill>
+                  <a:schemeClr val="tx1"/>
+                </a:solidFill>
+                <a:latin typeface="Verdana" pitchFamily="34" charset="0"/>
+                <a:ea typeface="Verdana" pitchFamily="34" charset="0"/>
+                <a:cs typeface="Verdana" pitchFamily="34" charset="0"/>
+              </a:rPr>
+              <a:t>•	Mục View Books trong Admin Panel.</a:t>
+            </a:r>
+          </a:p>
+          <a:p>
+            <a:pPr marL="400050" indent="-400050"/>
+            <a:r>
+              <a:rPr lang="vi-VN" dirty="0">
+                <a:solidFill>
+                  <a:schemeClr val="tx1"/>
+                </a:solidFill>
+                <a:latin typeface="Verdana" pitchFamily="34" charset="0"/>
+                <a:ea typeface="Verdana" pitchFamily="34" charset="0"/>
+                <a:cs typeface="Verdana" pitchFamily="34" charset="0"/>
+              </a:rPr>
+              <a:t>•	</a:t>
+            </a:r>
+            <a:r>
+              <a:rPr lang="en-US" dirty="0" err="1" smtClean="0">
+                <a:solidFill>
+                  <a:schemeClr val="tx1"/>
+                </a:solidFill>
+                <a:latin typeface="Verdana" pitchFamily="34" charset="0"/>
+                <a:ea typeface="Verdana" pitchFamily="34" charset="0"/>
+                <a:cs typeface="Verdana" pitchFamily="34" charset="0"/>
+              </a:rPr>
+              <a:t>Tạo</a:t>
+            </a:r>
+            <a:r>
+              <a:rPr lang="en-US" dirty="0" smtClean="0">
                 <a:solidFill>
                   <a:schemeClr val="tx1"/>
                 </a:solidFill>
@@ -8451,24 +8404,115 @@
               <a:t> </a:t>
             </a:r>
             <a:r>
-              <a:rPr lang="en-US" sz="2600" dirty="0" err="1" smtClean="0">
-                <a:solidFill>
-                  <a:schemeClr val="tx1"/>
-                </a:solidFill>
-                <a:latin typeface="Verdana" pitchFamily="34" charset="0"/>
-                <a:ea typeface="Verdana" pitchFamily="34" charset="0"/>
-                <a:cs typeface="Verdana" pitchFamily="34" charset="0"/>
-              </a:rPr>
-              <a:t>ảnh</a:t>
-            </a:r>
-            <a:endParaRPr lang="en-US" sz="2600" dirty="0">
-              <a:solidFill>
-                <a:schemeClr val="tx1"/>
-              </a:solidFill>
-              <a:latin typeface="Verdana" pitchFamily="34" charset="0"/>
-              <a:ea typeface="Verdana" pitchFamily="34" charset="0"/>
-              <a:cs typeface="Verdana" pitchFamily="34" charset="0"/>
-            </a:endParaRPr>
+              <a:rPr lang="en-US" dirty="0" err="1" smtClean="0">
+                <a:solidFill>
+                  <a:schemeClr val="tx1"/>
+                </a:solidFill>
+                <a:latin typeface="Verdana" pitchFamily="34" charset="0"/>
+                <a:ea typeface="Verdana" pitchFamily="34" charset="0"/>
+                <a:cs typeface="Verdana" pitchFamily="34" charset="0"/>
+              </a:rPr>
+              <a:t>sách</a:t>
+            </a:r>
+            <a:r>
+              <a:rPr lang="en-US" dirty="0" smtClean="0">
+                <a:solidFill>
+                  <a:schemeClr val="tx1"/>
+                </a:solidFill>
+                <a:latin typeface="Verdana" pitchFamily="34" charset="0"/>
+                <a:ea typeface="Verdana" pitchFamily="34" charset="0"/>
+                <a:cs typeface="Verdana" pitchFamily="34" charset="0"/>
+              </a:rPr>
+              <a:t> </a:t>
+            </a:r>
+            <a:r>
+              <a:rPr lang="en-US" dirty="0" err="1" smtClean="0">
+                <a:solidFill>
+                  <a:schemeClr val="tx1"/>
+                </a:solidFill>
+                <a:latin typeface="Verdana" pitchFamily="34" charset="0"/>
+                <a:ea typeface="Verdana" pitchFamily="34" charset="0"/>
+                <a:cs typeface="Verdana" pitchFamily="34" charset="0"/>
+              </a:rPr>
+              <a:t>mới</a:t>
+            </a:r>
+            <a:r>
+              <a:rPr lang="en-US" dirty="0" smtClean="0">
+                <a:solidFill>
+                  <a:schemeClr val="tx1"/>
+                </a:solidFill>
+                <a:latin typeface="Verdana" pitchFamily="34" charset="0"/>
+                <a:ea typeface="Verdana" pitchFamily="34" charset="0"/>
+                <a:cs typeface="Verdana" pitchFamily="34" charset="0"/>
+              </a:rPr>
+              <a:t> : </a:t>
+            </a:r>
+            <a:r>
+              <a:rPr lang="vi-VN" dirty="0" smtClean="0">
+                <a:solidFill>
+                  <a:schemeClr val="tx1"/>
+                </a:solidFill>
+                <a:latin typeface="Verdana" pitchFamily="34" charset="0"/>
+                <a:ea typeface="Verdana" pitchFamily="34" charset="0"/>
+                <a:cs typeface="Verdana" pitchFamily="34" charset="0"/>
+              </a:rPr>
+              <a:t>Điền </a:t>
+            </a:r>
+            <a:r>
+              <a:rPr lang="vi-VN" dirty="0">
+                <a:solidFill>
+                  <a:schemeClr val="tx1"/>
+                </a:solidFill>
+                <a:latin typeface="Verdana" pitchFamily="34" charset="0"/>
+                <a:ea typeface="Verdana" pitchFamily="34" charset="0"/>
+                <a:cs typeface="Verdana" pitchFamily="34" charset="0"/>
+              </a:rPr>
+              <a:t>đầy đủ thông tin </a:t>
+            </a:r>
+            <a:r>
+              <a:rPr lang="vi-VN" dirty="0" smtClean="0">
+                <a:solidFill>
+                  <a:schemeClr val="tx1"/>
+                </a:solidFill>
+                <a:latin typeface="Verdana" pitchFamily="34" charset="0"/>
+                <a:ea typeface="Verdana" pitchFamily="34" charset="0"/>
+                <a:cs typeface="Verdana" pitchFamily="34" charset="0"/>
+              </a:rPr>
+              <a:t>sá</a:t>
+            </a:r>
+            <a:r>
+              <a:rPr lang="en-US" dirty="0" err="1" smtClean="0">
+                <a:solidFill>
+                  <a:schemeClr val="tx1"/>
+                </a:solidFill>
+                <a:latin typeface="Verdana" pitchFamily="34" charset="0"/>
+                <a:ea typeface="Verdana" pitchFamily="34" charset="0"/>
+                <a:cs typeface="Verdana" pitchFamily="34" charset="0"/>
+              </a:rPr>
+              <a:t>ch</a:t>
+            </a:r>
+            <a:r>
+              <a:rPr lang="vi-VN" dirty="0" smtClean="0">
+                <a:solidFill>
+                  <a:schemeClr val="tx1"/>
+                </a:solidFill>
+                <a:latin typeface="Verdana" pitchFamily="34" charset="0"/>
+                <a:ea typeface="Verdana" pitchFamily="34" charset="0"/>
+                <a:cs typeface="Verdana" pitchFamily="34" charset="0"/>
+              </a:rPr>
+              <a:t> </a:t>
+            </a:r>
+            <a:r>
+              <a:rPr lang="vi-VN" dirty="0">
+                <a:solidFill>
+                  <a:schemeClr val="tx1"/>
+                </a:solidFill>
+                <a:latin typeface="Verdana" pitchFamily="34" charset="0"/>
+                <a:ea typeface="Verdana" pitchFamily="34" charset="0"/>
+                <a:cs typeface="Verdana" pitchFamily="34" charset="0"/>
+              </a:rPr>
+              <a:t>(tiêu đề, tác giả,…) và nhấn Create Book</a:t>
+            </a:r>
           </a:p>
         </p:txBody>
       </p:sp>
@@ -8623,10 +8667,10 @@
                 <a:ea typeface="Tahoma" pitchFamily="34" charset="0"/>
                 <a:cs typeface="Tahoma" pitchFamily="34" charset="0"/>
               </a:rPr>
-              <a:t>Chức</a:t>
-            </a:r>
-            <a:r>
-              <a:rPr lang="en-US" sz="4000" b="1" dirty="0" smtClean="0">
+              <a:t>Thông</a:t>
+            </a:r>
+            <a:r>
+              <a:rPr lang="en-US" sz="4000" b="1" dirty="0">
                 <a:solidFill>
                   <a:srgbClr val="FF0000"/>
                 </a:solidFill>
@@ -8644,7 +8688,7 @@
               <a:t> </a:t>
             </a:r>
             <a:r>
-              <a:rPr lang="en-US" sz="4000" b="1" dirty="0" err="1" smtClean="0">
+              <a:rPr lang="en-US" sz="4000" b="1" dirty="0" smtClean="0">
                 <a:solidFill>
                   <a:srgbClr val="FF0000"/>
                 </a:solidFill>
@@ -8659,10 +8703,10 @@
                 <a:ea typeface="Tahoma" pitchFamily="34" charset="0"/>
                 <a:cs typeface="Tahoma" pitchFamily="34" charset="0"/>
               </a:rPr>
-              <a:t>năng</a:t>
-            </a:r>
-            <a:r>
-              <a:rPr lang="en-US" sz="4000" b="1" dirty="0" smtClean="0">
+              <a:t>tin </a:t>
+            </a:r>
+            <a:r>
+              <a:rPr lang="en-US" sz="4000" b="1" dirty="0" err="1" smtClean="0">
                 <a:solidFill>
                   <a:srgbClr val="FF0000"/>
                 </a:solidFill>
@@ -8677,25 +8721,7 @@
                 <a:ea typeface="Tahoma" pitchFamily="34" charset="0"/>
                 <a:cs typeface="Tahoma" pitchFamily="34" charset="0"/>
               </a:rPr>
-              <a:t> </a:t>
-            </a:r>
-            <a:r>
-              <a:rPr lang="en-US" sz="4000" b="1" dirty="0" smtClean="0">
-                <a:solidFill>
-                  <a:srgbClr val="FF0000"/>
-                </a:solidFill>
-                <a:effectLst>
-                  <a:outerShdw blurRad="38100" dist="38100" dir="2700000" algn="tl">
-                    <a:srgbClr val="000000">
-                      <a:alpha val="43137"/>
-                    </a:srgbClr>
-                  </a:outerShdw>
-                </a:effectLst>
-                <a:latin typeface="Tahoma" pitchFamily="34" charset="0"/>
-                <a:ea typeface="Tahoma" pitchFamily="34" charset="0"/>
-                <a:cs typeface="Tahoma" pitchFamily="34" charset="0"/>
-              </a:rPr>
-              <a:t>11</a:t>
+              <a:t>sách</a:t>
             </a:r>
             <a:endParaRPr lang="en-US" sz="4000" b="1" dirty="0">
               <a:solidFill>
@@ -8723,7 +8749,7 @@
         </p:nvSpPr>
         <p:spPr>
           <a:xfrm>
-            <a:off x="11608594" y="23649920"/>
+            <a:off x="11099007" y="23649920"/>
             <a:ext cx="10644187" cy="707886"/>
           </a:xfrm>
           <a:prstGeom prst="rect">
@@ -8754,7 +8780,7 @@
                 <a:ea typeface="Tahoma" pitchFamily="34" charset="0"/>
                 <a:cs typeface="Tahoma" pitchFamily="34" charset="0"/>
               </a:rPr>
-              <a:t>Chức</a:t>
+              <a:t>Thêm</a:t>
             </a:r>
             <a:r>
               <a:rPr lang="en-US" sz="4000" b="1" dirty="0" smtClean="0">
@@ -8790,43 +8816,7 @@
                 <a:ea typeface="Tahoma" pitchFamily="34" charset="0"/>
                 <a:cs typeface="Tahoma" pitchFamily="34" charset="0"/>
               </a:rPr>
-              <a:t>năng</a:t>
-            </a:r>
-            <a:r>
-              <a:rPr lang="en-US" sz="4000" b="1" dirty="0" smtClean="0">
-                <a:solidFill>
-                  <a:srgbClr val="FF0000"/>
-                </a:solidFill>
-                <a:effectLst>
-                  <a:outerShdw blurRad="38100" dist="38100" dir="2700000" algn="tl">
-                    <a:srgbClr val="000000">
-                      <a:alpha val="43137"/>
-                    </a:srgbClr>
-                  </a:outerShdw>
-                </a:effectLst>
-                <a:latin typeface="Tahoma" pitchFamily="34" charset="0"/>
-                <a:ea typeface="Tahoma" pitchFamily="34" charset="0"/>
-                <a:cs typeface="Tahoma" pitchFamily="34" charset="0"/>
-              </a:rPr>
-              <a:t> </a:t>
-            </a:r>
-            <a:r>
-              <a:rPr lang="en-US" sz="4000" b="1" dirty="0" smtClean="0">
-                <a:solidFill>
-                  <a:srgbClr val="FF0000"/>
-                </a:solidFill>
-                <a:effectLst>
-                  <a:outerShdw blurRad="38100" dist="38100" dir="2700000" algn="tl">
-                    <a:srgbClr val="000000">
-                      <a:alpha val="43137"/>
-                    </a:srgbClr>
-                  </a:outerShdw>
-                </a:effectLst>
-                <a:latin typeface="Tahoma" pitchFamily="34" charset="0"/>
-                <a:ea typeface="Tahoma" pitchFamily="34" charset="0"/>
-                <a:cs typeface="Tahoma" pitchFamily="34" charset="0"/>
-              </a:rPr>
-              <a:t>12</a:t>
+              <a:t>sách</a:t>
             </a:r>
             <a:endParaRPr lang="en-US" sz="4000" b="1" dirty="0">
               <a:solidFill>
@@ -8846,6 +8836,218 @@
           </a:p>
         </p:txBody>
       </p:sp>
+      <p:pic>
+        <p:nvPicPr>
+          <p:cNvPr id="68" name="Picture 67"/>
+          <p:cNvPicPr/>
+          <p:nvPr/>
+        </p:nvPicPr>
+        <p:blipFill>
+          <a:blip r:embed="rId4"/>
+          <a:stretch>
+            <a:fillRect/>
+          </a:stretch>
+        </p:blipFill>
+        <p:spPr>
+          <a:xfrm>
+            <a:off x="4603832" y="21077871"/>
+            <a:ext cx="6105525" cy="2234565"/>
+          </a:xfrm>
+          <a:prstGeom prst="roundRect">
+            <a:avLst>
+              <a:gd name="adj" fmla="val 8594"/>
+            </a:avLst>
+          </a:prstGeom>
+          <a:solidFill>
+            <a:srgbClr val="FFFFFF">
+              <a:shade val="85000"/>
+            </a:srgbClr>
+          </a:solidFill>
+          <a:ln>
+            <a:noFill/>
+          </a:ln>
+          <a:effectLst>
+            <a:reflection blurRad="12700" stA="38000" endPos="28000" dist="5000" dir="5400000" sy="-100000" algn="bl" rotWithShape="0"/>
+          </a:effectLst>
+        </p:spPr>
+      </p:pic>
+      <p:pic>
+        <p:nvPicPr>
+          <p:cNvPr id="69" name="Picture 68"/>
+          <p:cNvPicPr/>
+          <p:nvPr/>
+        </p:nvPicPr>
+        <p:blipFill>
+          <a:blip r:embed="rId5"/>
+          <a:stretch>
+            <a:fillRect/>
+          </a:stretch>
+        </p:blipFill>
+        <p:spPr>
+          <a:xfrm>
+            <a:off x="15139301" y="21176458"/>
+            <a:ext cx="5962181" cy="2136635"/>
+          </a:xfrm>
+          <a:prstGeom prst="roundRect">
+            <a:avLst>
+              <a:gd name="adj" fmla="val 8594"/>
+            </a:avLst>
+          </a:prstGeom>
+          <a:solidFill>
+            <a:srgbClr val="FFFFFF">
+              <a:shade val="85000"/>
+            </a:srgbClr>
+          </a:solidFill>
+          <a:ln>
+            <a:noFill/>
+          </a:ln>
+          <a:effectLst>
+            <a:reflection blurRad="12700" stA="38000" endPos="28000" dist="5000" dir="5400000" sy="-100000" algn="bl" rotWithShape="0"/>
+          </a:effectLst>
+        </p:spPr>
+      </p:pic>
+      <p:pic>
+        <p:nvPicPr>
+          <p:cNvPr id="70" name="Picture 69"/>
+          <p:cNvPicPr/>
+          <p:nvPr/>
+        </p:nvPicPr>
+        <p:blipFill>
+          <a:blip r:embed="rId6"/>
+          <a:stretch>
+            <a:fillRect/>
+          </a:stretch>
+        </p:blipFill>
+        <p:spPr>
+          <a:xfrm>
+            <a:off x="4603832" y="24357807"/>
+            <a:ext cx="6105525" cy="1981200"/>
+          </a:xfrm>
+          <a:prstGeom prst="roundRect">
+            <a:avLst>
+              <a:gd name="adj" fmla="val 8594"/>
+            </a:avLst>
+          </a:prstGeom>
+          <a:solidFill>
+            <a:srgbClr val="FFFFFF">
+              <a:shade val="85000"/>
+            </a:srgbClr>
+          </a:solidFill>
+          <a:ln>
+            <a:noFill/>
+          </a:ln>
+          <a:effectLst>
+            <a:reflection blurRad="12700" stA="38000" endPos="28000" dist="5000" dir="5400000" sy="-100000" algn="bl" rotWithShape="0"/>
+          </a:effectLst>
+        </p:spPr>
+      </p:pic>
+      <p:pic>
+        <p:nvPicPr>
+          <p:cNvPr id="71" name="Picture 70"/>
+          <p:cNvPicPr/>
+          <p:nvPr/>
+        </p:nvPicPr>
+        <p:blipFill>
+          <a:blip r:embed="rId7"/>
+          <a:stretch>
+            <a:fillRect/>
+          </a:stretch>
+        </p:blipFill>
+        <p:spPr>
+          <a:xfrm>
+            <a:off x="15032362" y="24420374"/>
+            <a:ext cx="6019798" cy="1918632"/>
+          </a:xfrm>
+          <a:prstGeom prst="roundRect">
+            <a:avLst>
+              <a:gd name="adj" fmla="val 8594"/>
+            </a:avLst>
+          </a:prstGeom>
+          <a:solidFill>
+            <a:srgbClr val="FFFFFF">
+              <a:shade val="85000"/>
+            </a:srgbClr>
+          </a:solidFill>
+          <a:ln>
+            <a:noFill/>
+          </a:ln>
+          <a:effectLst>
+            <a:reflection blurRad="12700" stA="38000" endPos="28000" dist="5000" dir="5400000" sy="-100000" algn="bl" rotWithShape="0"/>
+          </a:effectLst>
+        </p:spPr>
+      </p:pic>
+      <p:pic>
+        <p:nvPicPr>
+          <p:cNvPr id="1027" name="Picture 3"/>
+          <p:cNvPicPr>
+            <a:picLocks noChangeAspect="1" noChangeArrowheads="1"/>
+          </p:cNvPicPr>
+          <p:nvPr/>
+        </p:nvPicPr>
+        <p:blipFill>
+          <a:blip r:embed="rId8">
+            <a:extLst>
+              <a:ext uri="{28A0092B-C50C-407E-A947-70E740481C1C}">
+                <a14:useLocalDpi xmlns:a14="http://schemas.microsoft.com/office/drawing/2010/main" val="0"/>
+              </a:ext>
+            </a:extLst>
+          </a:blip>
+          <a:srcRect/>
+          <a:stretch>
+            <a:fillRect/>
+          </a:stretch>
+        </p:blipFill>
+        <p:spPr bwMode="auto">
+          <a:xfrm>
+            <a:off x="483392" y="26594116"/>
+            <a:ext cx="6552714" cy="3326290"/>
+          </a:xfrm>
+          <a:prstGeom prst="roundRect">
+            <a:avLst>
+              <a:gd name="adj" fmla="val 8594"/>
+            </a:avLst>
+          </a:prstGeom>
+          <a:solidFill>
+            <a:srgbClr val="FFFFFF">
+              <a:shade val="85000"/>
+            </a:srgbClr>
+          </a:solidFill>
+          <a:ln>
+            <a:noFill/>
+          </a:ln>
+          <a:effectLst>
+            <a:reflection blurRad="12700" stA="38000" endPos="28000" dist="5000" dir="5400000" sy="-100000" algn="bl" rotWithShape="0"/>
+          </a:effectLst>
+          <a:extLst>
+            <a:ext uri="{909E8E84-426E-40DD-AFC4-6F175D3DCCD1}">
+              <a14:hiddenFill xmlns:a14="http://schemas.microsoft.com/office/drawing/2010/main">
+                <a:solidFill>
+                  <a:schemeClr val="accent1"/>
+                </a:solidFill>
+              </a14:hiddenFill>
+            </a:ext>
+            <a:ext uri="{91240B29-F687-4F45-9708-019B960494DF}">
+              <a14:hiddenLine xmlns:a14="http://schemas.microsoft.com/office/drawing/2010/main" w="9525">
+                <a:solidFill>
+                  <a:schemeClr val="tx1"/>
+                </a:solidFill>
+                <a:miter lim="800000"/>
+                <a:headEnd/>
+                <a:tailEnd/>
+              </a14:hiddenLine>
+            </a:ext>
+            <a:ext uri="{AF507438-7753-43E0-B8FC-AC1667EBCBE1}">
+              <a14:hiddenEffects xmlns:a14="http://schemas.microsoft.com/office/drawing/2010/main">
+                <a:effectLst>
+                  <a:outerShdw dist="35921" dir="2700000" algn="ctr" rotWithShape="0">
+                    <a:schemeClr val="bg2"/>
+                  </a:outerShdw>
+                </a:effectLst>
+              </a14:hiddenEffects>
+            </a:ext>
+          </a:extLst>
+        </p:spPr>
+      </p:pic>
     </p:spTree>
     <p:extLst>
       <p:ext uri="{BB962C8B-B14F-4D97-AF65-F5344CB8AC3E}">

</xml_diff>